<commit_message>
Simulink workshop content added.
</commit_message>
<xml_diff>
--- a/EE463/Simulink workshop/Presentation/Simulink Workshop 2018 - EE463.pptx
+++ b/EE463/Simulink workshop/Presentation/Simulink Workshop 2018 - EE463.pptx
@@ -5,7 +5,7 @@
     <p:sldMasterId id="2147483804" r:id="rId1"/>
   </p:sldMasterIdLst>
   <p:notesMasterIdLst>
-    <p:notesMasterId r:id="rId16"/>
+    <p:notesMasterId r:id="rId17"/>
   </p:notesMasterIdLst>
   <p:sldIdLst>
     <p:sldId id="290" r:id="rId2"/>
@@ -20,8 +20,9 @@
     <p:sldId id="414" r:id="rId11"/>
     <p:sldId id="415" r:id="rId12"/>
     <p:sldId id="416" r:id="rId13"/>
-    <p:sldId id="417" r:id="rId14"/>
-    <p:sldId id="418" r:id="rId15"/>
+    <p:sldId id="419" r:id="rId14"/>
+    <p:sldId id="417" r:id="rId15"/>
+    <p:sldId id="418" r:id="rId16"/>
   </p:sldIdLst>
   <p:sldSz cx="9144000" cy="6858000" type="screen4x3"/>
   <p:notesSz cx="6858000" cy="9144000"/>
@@ -221,7 +222,7 @@
           <a:p>
             <a:fld id="{D1C008C1-D970-43BD-9678-58985B84B3B0}" type="datetimeFigureOut">
               <a:rPr lang="tr-TR" smtClean="0"/>
-              <a:t>21.11.2017</a:t>
+              <a:t>23.11.2017</a:t>
             </a:fld>
             <a:endParaRPr lang="tr-TR"/>
           </a:p>
@@ -670,7 +671,7 @@
           <a:p>
             <a:fld id="{D275723C-A363-4114-BE18-3E9589C2B9C2}" type="datetime1">
               <a:rPr lang="en-US" smtClean="0"/>
-              <a:t>11/21/2017</a:t>
+              <a:t>11/23/2017</a:t>
             </a:fld>
             <a:endParaRPr lang="en-US" dirty="0"/>
           </a:p>
@@ -841,7 +842,7 @@
           <a:p>
             <a:fld id="{C5592633-93A2-4DB7-B3D8-5F6714E7EFEC}" type="datetime1">
               <a:rPr lang="en-US" smtClean="0"/>
-              <a:t>11/21/2017</a:t>
+              <a:t>11/23/2017</a:t>
             </a:fld>
             <a:endParaRPr lang="en-US" dirty="0"/>
           </a:p>
@@ -1022,7 +1023,7 @@
           <a:p>
             <a:fld id="{6F760D8D-AE05-4AF5-8666-75C48EA7B609}" type="datetime1">
               <a:rPr lang="en-US" smtClean="0"/>
-              <a:t>11/21/2017</a:t>
+              <a:t>11/23/2017</a:t>
             </a:fld>
             <a:endParaRPr lang="en-US" dirty="0"/>
           </a:p>
@@ -1193,7 +1194,7 @@
           <a:p>
             <a:fld id="{6D87B8C0-62AE-47C8-A8EF-FC863B0F06E5}" type="datetime1">
               <a:rPr lang="en-US" smtClean="0"/>
-              <a:t>11/21/2017</a:t>
+              <a:t>11/23/2017</a:t>
             </a:fld>
             <a:endParaRPr lang="en-US" dirty="0"/>
           </a:p>
@@ -1440,7 +1441,7 @@
           <a:p>
             <a:fld id="{A76C8472-C309-40FA-8240-FF6234B7F0D0}" type="datetime1">
               <a:rPr lang="en-US" smtClean="0"/>
-              <a:t>11/21/2017</a:t>
+              <a:t>11/23/2017</a:t>
             </a:fld>
             <a:endParaRPr lang="en-US" dirty="0"/>
           </a:p>
@@ -1729,7 +1730,7 @@
           <a:p>
             <a:fld id="{33196F6B-6F2E-418E-A1A6-2F06576F6EF7}" type="datetime1">
               <a:rPr lang="en-US" smtClean="0"/>
-              <a:t>11/21/2017</a:t>
+              <a:t>11/23/2017</a:t>
             </a:fld>
             <a:endParaRPr lang="en-US" dirty="0"/>
           </a:p>
@@ -2152,7 +2153,7 @@
           <a:p>
             <a:fld id="{D09CD6EC-2E00-46F1-9BD2-E1865A200410}" type="datetime1">
               <a:rPr lang="en-US" smtClean="0"/>
-              <a:t>11/21/2017</a:t>
+              <a:t>11/23/2017</a:t>
             </a:fld>
             <a:endParaRPr lang="en-US" dirty="0"/>
           </a:p>
@@ -2271,7 +2272,7 @@
           <a:p>
             <a:fld id="{C40B9E5A-6330-4749-ACDB-FB892FCFE6A5}" type="datetime1">
               <a:rPr lang="en-US" smtClean="0"/>
-              <a:t>11/21/2017</a:t>
+              <a:t>11/23/2017</a:t>
             </a:fld>
             <a:endParaRPr lang="en-US" dirty="0"/>
           </a:p>
@@ -2367,7 +2368,7 @@
           <a:p>
             <a:fld id="{1C181CB3-A768-4AD8-A97F-12E47CC1200D}" type="datetime1">
               <a:rPr lang="en-US" smtClean="0"/>
-              <a:t>11/21/2017</a:t>
+              <a:t>11/23/2017</a:t>
             </a:fld>
             <a:endParaRPr lang="en-US" dirty="0"/>
           </a:p>
@@ -2645,7 +2646,7 @@
           <a:p>
             <a:fld id="{AF3D8106-484C-46C6-8BE9-348BFA7F2DCB}" type="datetime1">
               <a:rPr lang="en-US" smtClean="0"/>
-              <a:t>11/21/2017</a:t>
+              <a:t>11/23/2017</a:t>
             </a:fld>
             <a:endParaRPr lang="en-US" dirty="0"/>
           </a:p>
@@ -2899,7 +2900,7 @@
           <a:p>
             <a:fld id="{F2A57B0D-110E-4AAD-9411-DA6CB39E8776}" type="datetime1">
               <a:rPr lang="en-US" smtClean="0"/>
-              <a:t>11/21/2017</a:t>
+              <a:t>11/23/2017</a:t>
             </a:fld>
             <a:endParaRPr lang="en-US" dirty="0"/>
           </a:p>
@@ -3131,7 +3132,7 @@
           <a:p>
             <a:fld id="{FB4B5B0E-55D6-4DAA-879D-58BBFFC7379B}" type="datetime1">
               <a:rPr lang="en-US" smtClean="0"/>
-              <a:t>11/21/2017</a:t>
+              <a:t>11/23/2017</a:t>
             </a:fld>
             <a:endParaRPr lang="en-US" dirty="0"/>
           </a:p>
@@ -5523,7 +5524,7 @@
           <a:p>
             <a:pPr algn="ctr"/>
             <a:r>
-              <a:rPr lang="tr-TR" sz="3200" b="1" dirty="0" err="1" smtClean="0">
+              <a:rPr lang="tr-TR" sz="3200" b="1" dirty="0" smtClean="0">
                 <a:solidFill>
                   <a:schemeClr val="tx2">
                     <a:lumMod val="60000"/>
@@ -5533,7 +5534,7 @@
                 <a:latin typeface="+mj-lt"/>
                 <a:cs typeface="Times New Roman" panose="02020603050405020304" pitchFamily="18" charset="0"/>
               </a:rPr>
-              <a:t>Examples</a:t>
+              <a:t>Content</a:t>
             </a:r>
             <a:endParaRPr lang="en-US" sz="3200" b="1" dirty="0" smtClean="0">
               <a:solidFill>
@@ -5577,40 +5578,322 @@
           </a:prstGeom>
         </p:spPr>
       </p:pic>
-      <p:pic>
-        <p:nvPicPr>
-          <p:cNvPr id="3" name="Picture 2"/>
-          <p:cNvPicPr>
-            <a:picLocks noChangeAspect="1"/>
-          </p:cNvPicPr>
+      <p:sp>
+        <p:nvSpPr>
+          <p:cNvPr id="16" name="TextBox 15"/>
+          <p:cNvSpPr txBox="1"/>
           <p:nvPr/>
-        </p:nvPicPr>
-        <p:blipFill>
-          <a:blip r:embed="rId4">
-            <a:extLst>
-              <a:ext uri="{28A0092B-C50C-407E-A947-70E740481C1C}">
-                <a14:useLocalDpi xmlns:a14="http://schemas.microsoft.com/office/drawing/2010/main" val="0"/>
-              </a:ext>
-            </a:extLst>
-          </a:blip>
-          <a:stretch>
-            <a:fillRect/>
-          </a:stretch>
-        </p:blipFill>
-        <p:spPr>
-          <a:xfrm>
-            <a:off x="2322159" y="1752600"/>
-            <a:ext cx="5384800" cy="4038600"/>
+        </p:nvSpPr>
+        <p:spPr>
+          <a:xfrm>
+            <a:off x="1356959" y="1828800"/>
+            <a:ext cx="3534482" cy="2185214"/>
           </a:xfrm>
           <a:prstGeom prst="rect">
             <a:avLst/>
           </a:prstGeom>
-        </p:spPr>
-      </p:pic>
+          <a:noFill/>
+          <a:ln>
+            <a:noFill/>
+          </a:ln>
+        </p:spPr>
+        <p:txBody>
+          <a:bodyPr wrap="square" rtlCol="0">
+            <a:spAutoFit/>
+          </a:bodyPr>
+          <a:lstStyle/>
+          <a:p>
+            <a:pPr algn="ctr"/>
+            <a:r>
+              <a:rPr lang="en-US" sz="2000" b="1" dirty="0" smtClean="0">
+                <a:latin typeface="+mj-lt"/>
+                <a:cs typeface="Times New Roman" panose="02020603050405020304" pitchFamily="18" charset="0"/>
+              </a:rPr>
+              <a:t>PART </a:t>
+            </a:r>
+            <a:r>
+              <a:rPr lang="en-US" sz="2000" b="1" dirty="0" smtClean="0">
+                <a:latin typeface="+mj-lt"/>
+                <a:cs typeface="Times New Roman" panose="02020603050405020304" pitchFamily="18" charset="0"/>
+              </a:rPr>
+              <a:t>I</a:t>
+            </a:r>
+            <a:endParaRPr lang="tr-TR" sz="2000" b="1" dirty="0" smtClean="0">
+              <a:latin typeface="+mj-lt"/>
+              <a:cs typeface="Times New Roman" panose="02020603050405020304" pitchFamily="18" charset="0"/>
+            </a:endParaRPr>
+          </a:p>
+          <a:p>
+            <a:pPr algn="ctr"/>
+            <a:endParaRPr lang="en-US" sz="2000" b="1" dirty="0" smtClean="0">
+              <a:latin typeface="+mj-lt"/>
+              <a:cs typeface="Times New Roman" panose="02020603050405020304" pitchFamily="18" charset="0"/>
+            </a:endParaRPr>
+          </a:p>
+          <a:p>
+            <a:pPr marL="342900" indent="-342900" algn="just">
+              <a:buFont typeface="Wingdings" panose="05000000000000000000" pitchFamily="2" charset="2"/>
+              <a:buChar char="§"/>
+            </a:pPr>
+            <a:r>
+              <a:rPr lang="en-US" sz="2000" dirty="0" smtClean="0">
+                <a:latin typeface="+mj-lt"/>
+                <a:cs typeface="Times New Roman" panose="02020603050405020304" pitchFamily="18" charset="0"/>
+              </a:rPr>
+              <a:t>Very </a:t>
+            </a:r>
+            <a:r>
+              <a:rPr lang="en-US" sz="2000" dirty="0" smtClean="0">
+                <a:latin typeface="+mj-lt"/>
+                <a:cs typeface="Times New Roman" panose="02020603050405020304" pitchFamily="18" charset="0"/>
+              </a:rPr>
+              <a:t>first </a:t>
+            </a:r>
+            <a:r>
+              <a:rPr lang="en-US" sz="2000" dirty="0" smtClean="0">
+                <a:latin typeface="+mj-lt"/>
+                <a:cs typeface="Times New Roman" panose="02020603050405020304" pitchFamily="18" charset="0"/>
+              </a:rPr>
+              <a:t>model</a:t>
+            </a:r>
+            <a:endParaRPr lang="en-US" sz="2000" dirty="0" smtClean="0">
+              <a:latin typeface="+mj-lt"/>
+              <a:cs typeface="Times New Roman" panose="02020603050405020304" pitchFamily="18" charset="0"/>
+            </a:endParaRPr>
+          </a:p>
+          <a:p>
+            <a:pPr marL="800100" lvl="1" indent="-342900" algn="just">
+              <a:buFont typeface="Courier New" panose="02070309020205020404" pitchFamily="49" charset="0"/>
+              <a:buChar char="o"/>
+            </a:pPr>
+            <a:endParaRPr lang="tr-TR" sz="1600" dirty="0" smtClean="0">
+              <a:latin typeface="+mj-lt"/>
+              <a:cs typeface="Times New Roman" panose="02020603050405020304" pitchFamily="18" charset="0"/>
+            </a:endParaRPr>
+          </a:p>
+          <a:p>
+            <a:pPr marL="342900" indent="-342900" algn="just">
+              <a:buFont typeface="Wingdings" panose="05000000000000000000" pitchFamily="2" charset="2"/>
+              <a:buChar char="§"/>
+            </a:pPr>
+            <a:r>
+              <a:rPr lang="en-US" sz="2000" dirty="0" smtClean="0">
+                <a:latin typeface="+mj-lt"/>
+                <a:cs typeface="Times New Roman" panose="02020603050405020304" pitchFamily="18" charset="0"/>
+              </a:rPr>
+              <a:t>Common blocks</a:t>
+            </a:r>
+            <a:endParaRPr lang="tr-TR" sz="2000" dirty="0" smtClean="0">
+              <a:latin typeface="+mj-lt"/>
+              <a:cs typeface="Times New Roman" panose="02020603050405020304" pitchFamily="18" charset="0"/>
+            </a:endParaRPr>
+          </a:p>
+          <a:p>
+            <a:pPr marL="342900" indent="-342900" algn="just">
+              <a:buFont typeface="Wingdings" panose="05000000000000000000" pitchFamily="2" charset="2"/>
+              <a:buChar char="§"/>
+            </a:pPr>
+            <a:endParaRPr lang="tr-TR" sz="2000" dirty="0" smtClean="0">
+              <a:latin typeface="+mj-lt"/>
+              <a:cs typeface="Times New Roman" panose="02020603050405020304" pitchFamily="18" charset="0"/>
+            </a:endParaRPr>
+          </a:p>
+          <a:p>
+            <a:pPr marL="342900" indent="-342900" algn="just">
+              <a:buFont typeface="Wingdings" panose="05000000000000000000" pitchFamily="2" charset="2"/>
+              <a:buChar char="§"/>
+            </a:pPr>
+            <a:r>
+              <a:rPr lang="en-US" sz="2000" dirty="0" smtClean="0">
+                <a:latin typeface="+mj-lt"/>
+                <a:cs typeface="Times New Roman" panose="02020603050405020304" pitchFamily="18" charset="0"/>
+              </a:rPr>
+              <a:t>Transfer functions</a:t>
+            </a:r>
+            <a:endParaRPr lang="en-US" sz="2000" dirty="0" smtClean="0">
+              <a:latin typeface="+mj-lt"/>
+              <a:cs typeface="Times New Roman" panose="02020603050405020304" pitchFamily="18" charset="0"/>
+            </a:endParaRPr>
+          </a:p>
+        </p:txBody>
+      </p:sp>
+      <p:sp>
+        <p:nvSpPr>
+          <p:cNvPr id="18" name="TextBox 17"/>
+          <p:cNvSpPr txBox="1"/>
+          <p:nvPr/>
+        </p:nvSpPr>
+        <p:spPr>
+          <a:xfrm>
+            <a:off x="5105400" y="1828800"/>
+            <a:ext cx="3505200" cy="2677656"/>
+          </a:xfrm>
+          <a:prstGeom prst="rect">
+            <a:avLst/>
+          </a:prstGeom>
+          <a:noFill/>
+          <a:ln>
+            <a:noFill/>
+          </a:ln>
+        </p:spPr>
+        <p:txBody>
+          <a:bodyPr wrap="square" rtlCol="0">
+            <a:spAutoFit/>
+          </a:bodyPr>
+          <a:lstStyle/>
+          <a:p>
+            <a:pPr algn="ctr"/>
+            <a:r>
+              <a:rPr lang="en-US" sz="2000" b="1" dirty="0" smtClean="0">
+                <a:cs typeface="Times New Roman" panose="02020603050405020304" pitchFamily="18" charset="0"/>
+              </a:rPr>
+              <a:t>PART II</a:t>
+            </a:r>
+            <a:endParaRPr lang="en-US" sz="2000" dirty="0" smtClean="0">
+              <a:latin typeface="+mj-lt"/>
+              <a:cs typeface="Times New Roman" panose="02020603050405020304" pitchFamily="18" charset="0"/>
+            </a:endParaRPr>
+          </a:p>
+          <a:p>
+            <a:pPr marL="342900" indent="-342900" algn="just">
+              <a:buFont typeface="Wingdings" panose="05000000000000000000" pitchFamily="2" charset="2"/>
+              <a:buChar char="§"/>
+            </a:pPr>
+            <a:endParaRPr lang="tr-TR" sz="2000" dirty="0" smtClean="0">
+              <a:latin typeface="+mj-lt"/>
+              <a:cs typeface="Times New Roman" panose="02020603050405020304" pitchFamily="18" charset="0"/>
+            </a:endParaRPr>
+          </a:p>
+          <a:p>
+            <a:pPr marL="342900" indent="-342900" algn="just">
+              <a:buFont typeface="Wingdings" panose="05000000000000000000" pitchFamily="2" charset="2"/>
+              <a:buChar char="§"/>
+            </a:pPr>
+            <a:r>
+              <a:rPr lang="en-US" sz="2000" dirty="0" smtClean="0">
+                <a:latin typeface="+mj-lt"/>
+                <a:cs typeface="Times New Roman" panose="02020603050405020304" pitchFamily="18" charset="0"/>
+              </a:rPr>
+              <a:t>Electrical systems</a:t>
+            </a:r>
+            <a:endParaRPr lang="en-US" sz="2000" dirty="0" smtClean="0">
+              <a:latin typeface="+mj-lt"/>
+              <a:cs typeface="Times New Roman" panose="02020603050405020304" pitchFamily="18" charset="0"/>
+            </a:endParaRPr>
+          </a:p>
+          <a:p>
+            <a:pPr marL="800100" lvl="1" indent="-342900" algn="just">
+              <a:buFont typeface="Courier New" panose="02070309020205020404" pitchFamily="49" charset="0"/>
+              <a:buChar char="o"/>
+            </a:pPr>
+            <a:endParaRPr lang="tr-TR" sz="1600" dirty="0" smtClean="0">
+              <a:cs typeface="Times New Roman" panose="02020603050405020304" pitchFamily="18" charset="0"/>
+            </a:endParaRPr>
+          </a:p>
+          <a:p>
+            <a:pPr marL="342900" indent="-342900" algn="just">
+              <a:buFont typeface="Wingdings" panose="05000000000000000000" pitchFamily="2" charset="2"/>
+              <a:buChar char="§"/>
+            </a:pPr>
+            <a:r>
+              <a:rPr lang="en-US" sz="2000" dirty="0" smtClean="0">
+                <a:latin typeface="+mj-lt"/>
+                <a:cs typeface="Times New Roman" panose="02020603050405020304" pitchFamily="18" charset="0"/>
+              </a:rPr>
+              <a:t>Single </a:t>
+            </a:r>
+            <a:r>
+              <a:rPr lang="en-US" sz="2000" dirty="0" smtClean="0">
+                <a:latin typeface="+mj-lt"/>
+                <a:cs typeface="Times New Roman" panose="02020603050405020304" pitchFamily="18" charset="0"/>
+              </a:rPr>
+              <a:t>phase </a:t>
+            </a:r>
+            <a:r>
+              <a:rPr lang="en-US" sz="2000" dirty="0" smtClean="0">
+                <a:latin typeface="+mj-lt"/>
+                <a:cs typeface="Times New Roman" panose="02020603050405020304" pitchFamily="18" charset="0"/>
+              </a:rPr>
+              <a:t>rectifiers</a:t>
+            </a:r>
+            <a:endParaRPr lang="en-US" sz="2000" dirty="0" smtClean="0">
+              <a:latin typeface="+mj-lt"/>
+              <a:cs typeface="Times New Roman" panose="02020603050405020304" pitchFamily="18" charset="0"/>
+            </a:endParaRPr>
+          </a:p>
+          <a:p>
+            <a:pPr marL="800100" lvl="1" indent="-342900" algn="just">
+              <a:buFont typeface="Courier New" panose="02070309020205020404" pitchFamily="49" charset="0"/>
+              <a:buChar char="o"/>
+            </a:pPr>
+            <a:endParaRPr lang="tr-TR" sz="1600" dirty="0" smtClean="0">
+              <a:latin typeface="+mj-lt"/>
+              <a:cs typeface="Times New Roman" panose="02020603050405020304" pitchFamily="18" charset="0"/>
+            </a:endParaRPr>
+          </a:p>
+          <a:p>
+            <a:pPr marL="342900" indent="-342900" algn="just">
+              <a:buFont typeface="Wingdings" panose="05000000000000000000" pitchFamily="2" charset="2"/>
+              <a:buChar char="§"/>
+            </a:pPr>
+            <a:r>
+              <a:rPr lang="en-US" sz="2000" dirty="0" smtClean="0">
+                <a:latin typeface="+mj-lt"/>
+                <a:cs typeface="Times New Roman" panose="02020603050405020304" pitchFamily="18" charset="0"/>
+              </a:rPr>
+              <a:t>Three-phase rectifiers</a:t>
+            </a:r>
+            <a:endParaRPr lang="en-US" sz="2000" dirty="0" smtClean="0">
+              <a:latin typeface="+mj-lt"/>
+              <a:cs typeface="Times New Roman" panose="02020603050405020304" pitchFamily="18" charset="0"/>
+            </a:endParaRPr>
+          </a:p>
+          <a:p>
+            <a:pPr marL="800100" lvl="1" indent="-342900" algn="just">
+              <a:buFont typeface="Courier New" panose="02070309020205020404" pitchFamily="49" charset="0"/>
+              <a:buChar char="o"/>
+            </a:pPr>
+            <a:endParaRPr lang="tr-TR" sz="1600" dirty="0" smtClean="0">
+              <a:cs typeface="Times New Roman" panose="02020603050405020304" pitchFamily="18" charset="0"/>
+            </a:endParaRPr>
+          </a:p>
+          <a:p>
+            <a:pPr marL="342900" indent="-342900" algn="just">
+              <a:buFont typeface="Wingdings" panose="05000000000000000000" pitchFamily="2" charset="2"/>
+              <a:buChar char="§"/>
+            </a:pPr>
+            <a:r>
+              <a:rPr lang="en-US" sz="2000" dirty="0" smtClean="0">
+                <a:latin typeface="+mj-lt"/>
+                <a:cs typeface="Times New Roman" panose="02020603050405020304" pitchFamily="18" charset="0"/>
+              </a:rPr>
+              <a:t>Controlled</a:t>
+            </a:r>
+            <a:r>
+              <a:rPr lang="tr-TR" sz="2000" dirty="0" smtClean="0">
+                <a:latin typeface="+mj-lt"/>
+                <a:cs typeface="Times New Roman" panose="02020603050405020304" pitchFamily="18" charset="0"/>
+              </a:rPr>
+              <a:t> </a:t>
+            </a:r>
+            <a:r>
+              <a:rPr lang="tr-TR" sz="2000" dirty="0" err="1" smtClean="0">
+                <a:latin typeface="+mj-lt"/>
+                <a:cs typeface="Times New Roman" panose="02020603050405020304" pitchFamily="18" charset="0"/>
+              </a:rPr>
+              <a:t>rectifiers</a:t>
+            </a:r>
+            <a:endParaRPr lang="en-US" sz="2000" dirty="0" smtClean="0">
+              <a:latin typeface="+mj-lt"/>
+              <a:cs typeface="Times New Roman" panose="02020603050405020304" pitchFamily="18" charset="0"/>
+            </a:endParaRPr>
+          </a:p>
+        </p:txBody>
+      </p:sp>
     </p:spTree>
     <p:extLst>
       <p:ext uri="{BB962C8B-B14F-4D97-AF65-F5344CB8AC3E}">
-        <p14:creationId xmlns:p14="http://schemas.microsoft.com/office/powerpoint/2010/main" val="1517511336"/>
+        <p14:creationId xmlns:p14="http://schemas.microsoft.com/office/powerpoint/2010/main" val="2180552284"/>
       </p:ext>
     </p:extLst>
   </p:cSld>
@@ -5628,7 +5911,7 @@
 </file>
 
 <file path=ppt/slides/slide14.xml><?xml version="1.0" encoding="utf-8"?>
-<p:sld xmlns:a="http://schemas.openxmlformats.org/drawingml/2006/main" xmlns:r="http://schemas.openxmlformats.org/officeDocument/2006/relationships" xmlns:p="http://schemas.openxmlformats.org/presentationml/2006/main" show="0">
+<p:sld xmlns:a="http://schemas.openxmlformats.org/drawingml/2006/main" xmlns:r="http://schemas.openxmlformats.org/officeDocument/2006/relationships" xmlns:p="http://schemas.openxmlformats.org/presentationml/2006/main">
   <p:cSld>
     <p:spTree>
       <p:nvGrpSpPr>
@@ -5797,6 +6080,350 @@
               <a:rPr lang="en-US" smtClean="0"/>
               <a:pPr/>
               <a:t>14</a:t>
+            </a:fld>
+            <a:endParaRPr lang="en-US" dirty="0"/>
+          </a:p>
+        </p:txBody>
+      </p:sp>
+      <p:pic>
+        <p:nvPicPr>
+          <p:cNvPr id="14" name="Picture 2" descr="C:\Users\Mesut\Desktop\aselsan sunum\aselsan sunum 10 ekim\aselsan sunum\cezmi bey\ODTU.png"/>
+          <p:cNvPicPr>
+            <a:picLocks noChangeAspect="1" noChangeArrowheads="1"/>
+          </p:cNvPicPr>
+          <p:nvPr/>
+        </p:nvPicPr>
+        <p:blipFill>
+          <a:blip r:embed="rId2" cstate="print">
+            <a:extLst>
+              <a:ext uri="{28A0092B-C50C-407E-A947-70E740481C1C}">
+                <a14:useLocalDpi xmlns:a14="http://schemas.microsoft.com/office/drawing/2010/main" val="0"/>
+              </a:ext>
+            </a:extLst>
+          </a:blip>
+          <a:srcRect/>
+          <a:stretch>
+            <a:fillRect/>
+          </a:stretch>
+        </p:blipFill>
+        <p:spPr bwMode="auto">
+          <a:xfrm>
+            <a:off x="163507" y="266700"/>
+            <a:ext cx="684927" cy="571500"/>
+          </a:xfrm>
+          <a:prstGeom prst="rect">
+            <a:avLst/>
+          </a:prstGeom>
+          <a:noFill/>
+          <a:extLst>
+            <a:ext uri="{909E8E84-426E-40DD-AFC4-6F175D3DCCD1}">
+              <a14:hiddenFill xmlns:a14="http://schemas.microsoft.com/office/drawing/2010/main">
+                <a:solidFill>
+                  <a:srgbClr val="FFFFFF"/>
+                </a:solidFill>
+              </a14:hiddenFill>
+            </a:ext>
+          </a:extLst>
+        </p:spPr>
+      </p:pic>
+      <p:sp>
+        <p:nvSpPr>
+          <p:cNvPr id="12" name="TextBox 11"/>
+          <p:cNvSpPr txBox="1"/>
+          <p:nvPr/>
+        </p:nvSpPr>
+        <p:spPr>
+          <a:xfrm>
+            <a:off x="1038507" y="201239"/>
+            <a:ext cx="7953093" cy="584775"/>
+          </a:xfrm>
+          <a:prstGeom prst="rect">
+            <a:avLst/>
+          </a:prstGeom>
+          <a:noFill/>
+        </p:spPr>
+        <p:txBody>
+          <a:bodyPr wrap="square" rtlCol="0">
+            <a:spAutoFit/>
+          </a:bodyPr>
+          <a:lstStyle/>
+          <a:p>
+            <a:pPr algn="ctr"/>
+            <a:r>
+              <a:rPr lang="tr-TR" sz="3200" b="1" dirty="0" err="1" smtClean="0">
+                <a:solidFill>
+                  <a:schemeClr val="tx2">
+                    <a:lumMod val="60000"/>
+                    <a:lumOff val="40000"/>
+                  </a:schemeClr>
+                </a:solidFill>
+                <a:latin typeface="+mj-lt"/>
+                <a:cs typeface="Times New Roman" panose="02020603050405020304" pitchFamily="18" charset="0"/>
+              </a:rPr>
+              <a:t>Examples</a:t>
+            </a:r>
+            <a:endParaRPr lang="en-US" sz="3200" b="1" dirty="0" smtClean="0">
+              <a:solidFill>
+                <a:schemeClr val="tx2">
+                  <a:lumMod val="60000"/>
+                  <a:lumOff val="40000"/>
+                </a:schemeClr>
+              </a:solidFill>
+              <a:latin typeface="+mj-lt"/>
+              <a:cs typeface="Times New Roman" panose="02020603050405020304" pitchFamily="18" charset="0"/>
+            </a:endParaRPr>
+          </a:p>
+        </p:txBody>
+      </p:sp>
+      <p:pic>
+        <p:nvPicPr>
+          <p:cNvPr id="17" name="Picture 16"/>
+          <p:cNvPicPr>
+            <a:picLocks noChangeAspect="1"/>
+          </p:cNvPicPr>
+          <p:nvPr/>
+        </p:nvPicPr>
+        <p:blipFill rotWithShape="1">
+          <a:blip r:embed="rId3" cstate="print">
+            <a:extLst>
+              <a:ext uri="{28A0092B-C50C-407E-A947-70E740481C1C}">
+                <a14:useLocalDpi xmlns:a14="http://schemas.microsoft.com/office/drawing/2010/main" val="0"/>
+              </a:ext>
+            </a:extLst>
+          </a:blip>
+          <a:srcRect t="21816" b="28319"/>
+          <a:stretch/>
+        </p:blipFill>
+        <p:spPr>
+          <a:xfrm>
+            <a:off x="1038507" y="88240"/>
+            <a:ext cx="2085693" cy="639612"/>
+          </a:xfrm>
+          <a:prstGeom prst="rect">
+            <a:avLst/>
+          </a:prstGeom>
+        </p:spPr>
+      </p:pic>
+      <p:pic>
+        <p:nvPicPr>
+          <p:cNvPr id="3" name="Picture 2"/>
+          <p:cNvPicPr>
+            <a:picLocks noChangeAspect="1"/>
+          </p:cNvPicPr>
+          <p:nvPr/>
+        </p:nvPicPr>
+        <p:blipFill>
+          <a:blip r:embed="rId4">
+            <a:extLst>
+              <a:ext uri="{28A0092B-C50C-407E-A947-70E740481C1C}">
+                <a14:useLocalDpi xmlns:a14="http://schemas.microsoft.com/office/drawing/2010/main" val="0"/>
+              </a:ext>
+            </a:extLst>
+          </a:blip>
+          <a:stretch>
+            <a:fillRect/>
+          </a:stretch>
+        </p:blipFill>
+        <p:spPr>
+          <a:xfrm>
+            <a:off x="2322159" y="1752600"/>
+            <a:ext cx="5384800" cy="4038600"/>
+          </a:xfrm>
+          <a:prstGeom prst="rect">
+            <a:avLst/>
+          </a:prstGeom>
+        </p:spPr>
+      </p:pic>
+    </p:spTree>
+    <p:extLst>
+      <p:ext uri="{BB962C8B-B14F-4D97-AF65-F5344CB8AC3E}">
+        <p14:creationId xmlns:p14="http://schemas.microsoft.com/office/powerpoint/2010/main" val="1517511336"/>
+      </p:ext>
+    </p:extLst>
+  </p:cSld>
+  <p:clrMapOvr>
+    <a:masterClrMapping/>
+  </p:clrMapOvr>
+  <p:timing>
+    <p:tnLst>
+      <p:par>
+        <p:cTn id="1" dur="indefinite" restart="never" nodeType="tmRoot"/>
+      </p:par>
+    </p:tnLst>
+  </p:timing>
+</p:sld>
+</file>
+
+<file path=ppt/slides/slide15.xml><?xml version="1.0" encoding="utf-8"?>
+<p:sld xmlns:a="http://schemas.openxmlformats.org/drawingml/2006/main" xmlns:r="http://schemas.openxmlformats.org/officeDocument/2006/relationships" xmlns:p="http://schemas.openxmlformats.org/presentationml/2006/main" show="0">
+  <p:cSld>
+    <p:spTree>
+      <p:nvGrpSpPr>
+        <p:cNvPr id="1" name=""/>
+        <p:cNvGrpSpPr/>
+        <p:nvPr/>
+      </p:nvGrpSpPr>
+      <p:grpSpPr>
+        <a:xfrm>
+          <a:off x="0" y="0"/>
+          <a:ext cx="0" cy="0"/>
+          <a:chOff x="0" y="0"/>
+          <a:chExt cx="0" cy="0"/>
+        </a:xfrm>
+      </p:grpSpPr>
+      <p:sp>
+        <p:nvSpPr>
+          <p:cNvPr id="10" name="Rectangle 9"/>
+          <p:cNvSpPr/>
+          <p:nvPr/>
+        </p:nvSpPr>
+        <p:spPr>
+          <a:xfrm>
+            <a:off x="0" y="12106"/>
+            <a:ext cx="1011942" cy="6854083"/>
+          </a:xfrm>
+          <a:prstGeom prst="rect">
+            <a:avLst/>
+          </a:prstGeom>
+          <a:gradFill flip="none" rotWithShape="1">
+            <a:gsLst>
+              <a:gs pos="50000">
+                <a:srgbClr val="D00000"/>
+              </a:gs>
+              <a:gs pos="0">
+                <a:srgbClr val="FF0000">
+                  <a:shade val="30000"/>
+                  <a:satMod val="115000"/>
+                </a:srgbClr>
+              </a:gs>
+              <a:gs pos="100000">
+                <a:schemeClr val="accent2">
+                  <a:lumMod val="60000"/>
+                  <a:lumOff val="40000"/>
+                </a:schemeClr>
+              </a:gs>
+            </a:gsLst>
+            <a:lin ang="5400000" scaled="1"/>
+            <a:tileRect/>
+          </a:gradFill>
+          <a:ln>
+            <a:noFill/>
+          </a:ln>
+        </p:spPr>
+        <p:style>
+          <a:lnRef idx="2">
+            <a:schemeClr val="accent1">
+              <a:shade val="50000"/>
+            </a:schemeClr>
+          </a:lnRef>
+          <a:fillRef idx="1">
+            <a:schemeClr val="accent1"/>
+          </a:fillRef>
+          <a:effectRef idx="0">
+            <a:schemeClr val="accent1"/>
+          </a:effectRef>
+          <a:fontRef idx="minor">
+            <a:schemeClr val="lt1"/>
+          </a:fontRef>
+        </p:style>
+        <p:txBody>
+          <a:bodyPr rtlCol="0" anchor="ctr"/>
+          <a:lstStyle/>
+          <a:p>
+            <a:pPr algn="ctr"/>
+            <a:endParaRPr lang="tr-TR"/>
+          </a:p>
+        </p:txBody>
+      </p:sp>
+      <p:cxnSp>
+        <p:nvCxnSpPr>
+          <p:cNvPr id="11" name="Straight Connector 10"/>
+          <p:cNvCxnSpPr/>
+          <p:nvPr/>
+        </p:nvCxnSpPr>
+        <p:spPr>
+          <a:xfrm>
+            <a:off x="1189918" y="838200"/>
+            <a:ext cx="7649282" cy="0"/>
+          </a:xfrm>
+          <a:prstGeom prst="line">
+            <a:avLst/>
+          </a:prstGeom>
+          <a:ln w="50800">
+            <a:solidFill>
+              <a:srgbClr val="F20000"/>
+            </a:solidFill>
+          </a:ln>
+        </p:spPr>
+        <p:style>
+          <a:lnRef idx="1">
+            <a:schemeClr val="accent1"/>
+          </a:lnRef>
+          <a:fillRef idx="0">
+            <a:schemeClr val="accent1"/>
+          </a:fillRef>
+          <a:effectRef idx="0">
+            <a:schemeClr val="accent1"/>
+          </a:effectRef>
+          <a:fontRef idx="minor">
+            <a:schemeClr val="tx1"/>
+          </a:fontRef>
+        </p:style>
+      </p:cxnSp>
+      <p:cxnSp>
+        <p:nvCxnSpPr>
+          <p:cNvPr id="15" name="Straight Connector 14"/>
+          <p:cNvCxnSpPr/>
+          <p:nvPr/>
+        </p:nvCxnSpPr>
+        <p:spPr>
+          <a:xfrm>
+            <a:off x="1189918" y="914400"/>
+            <a:ext cx="7649282" cy="0"/>
+          </a:xfrm>
+          <a:prstGeom prst="line">
+            <a:avLst/>
+          </a:prstGeom>
+          <a:ln w="19050">
+            <a:solidFill>
+              <a:srgbClr val="F20000"/>
+            </a:solidFill>
+          </a:ln>
+        </p:spPr>
+        <p:style>
+          <a:lnRef idx="1">
+            <a:schemeClr val="accent1"/>
+          </a:lnRef>
+          <a:fillRef idx="0">
+            <a:schemeClr val="accent1"/>
+          </a:fillRef>
+          <a:effectRef idx="0">
+            <a:schemeClr val="accent1"/>
+          </a:effectRef>
+          <a:fontRef idx="minor">
+            <a:schemeClr val="tx1"/>
+          </a:fontRef>
+        </p:style>
+      </p:cxnSp>
+      <p:sp>
+        <p:nvSpPr>
+          <p:cNvPr id="2" name="Slide Number Placeholder 1"/>
+          <p:cNvSpPr>
+            <a:spLocks noGrp="1"/>
+          </p:cNvSpPr>
+          <p:nvPr>
+            <p:ph type="sldNum" sz="quarter" idx="12"/>
+          </p:nvPr>
+        </p:nvSpPr>
+        <p:spPr/>
+        <p:txBody>
+          <a:bodyPr/>
+          <a:lstStyle/>
+          <a:p>
+            <a:fld id="{B6F15528-21DE-4FAA-801E-634DDDAF4B2B}" type="slidenum">
+              <a:rPr lang="en-US" smtClean="0"/>
+              <a:pPr/>
+              <a:t>15</a:t>
             </a:fld>
             <a:endParaRPr lang="en-US" dirty="0"/>
           </a:p>

</xml_diff>